<commit_message>
Even more changes :D
</commit_message>
<xml_diff>
--- a/presentation/Presentation Group11.pptx
+++ b/presentation/Presentation Group11.pptx
@@ -11,7 +11,13 @@
     <p:sldId id="261" r:id="rId5"/>
     <p:sldId id="263" r:id="rId6"/>
     <p:sldId id="264" r:id="rId7"/>
-    <p:sldId id="262" r:id="rId8"/>
+    <p:sldId id="268" r:id="rId8"/>
+    <p:sldId id="262" r:id="rId9"/>
+    <p:sldId id="265" r:id="rId10"/>
+    <p:sldId id="266" r:id="rId11"/>
+    <p:sldId id="267" r:id="rId12"/>
+    <p:sldId id="270" r:id="rId13"/>
+    <p:sldId id="271" r:id="rId14"/>
   </p:sldIdLst>
   <p:sldSz cx="12192000" cy="6858000"/>
   <p:notesSz cx="6858000" cy="9144000"/>
@@ -247,7 +253,7 @@
           <a:p>
             <a:fld id="{55B6B420-1CC8-400D-8A09-0509FF2B3B78}" type="datetimeFigureOut">
               <a:rPr lang="de-DE" smtClean="0"/>
-              <a:t>11.09.2019</a:t>
+              <a:t>12.09.2019</a:t>
             </a:fld>
             <a:endParaRPr lang="de-DE"/>
           </a:p>
@@ -448,7 +454,7 @@
           <a:p>
             <a:fld id="{55B6B420-1CC8-400D-8A09-0509FF2B3B78}" type="datetimeFigureOut">
               <a:rPr lang="de-DE" smtClean="0"/>
-              <a:t>11.09.2019</a:t>
+              <a:t>12.09.2019</a:t>
             </a:fld>
             <a:endParaRPr lang="de-DE"/>
           </a:p>
@@ -659,7 +665,7 @@
           <a:p>
             <a:fld id="{55B6B420-1CC8-400D-8A09-0509FF2B3B78}" type="datetimeFigureOut">
               <a:rPr lang="de-DE" smtClean="0"/>
-              <a:t>11.09.2019</a:t>
+              <a:t>12.09.2019</a:t>
             </a:fld>
             <a:endParaRPr lang="de-DE"/>
           </a:p>
@@ -2346,7 +2352,7 @@
           <a:p>
             <a:fld id="{55B6B420-1CC8-400D-8A09-0509FF2B3B78}" type="datetimeFigureOut">
               <a:rPr lang="de-DE" smtClean="0"/>
-              <a:t>11.09.2019</a:t>
+              <a:t>12.09.2019</a:t>
             </a:fld>
             <a:endParaRPr lang="de-DE"/>
           </a:p>
@@ -2595,7 +2601,7 @@
           <a:p>
             <a:fld id="{55B6B420-1CC8-400D-8A09-0509FF2B3B78}" type="datetimeFigureOut">
               <a:rPr lang="de-DE" smtClean="0"/>
-              <a:t>11.09.2019</a:t>
+              <a:t>12.09.2019</a:t>
             </a:fld>
             <a:endParaRPr lang="de-DE"/>
           </a:p>
@@ -2886,7 +2892,7 @@
           <a:p>
             <a:fld id="{55B6B420-1CC8-400D-8A09-0509FF2B3B78}" type="datetimeFigureOut">
               <a:rPr lang="de-DE" smtClean="0"/>
-              <a:t>11.09.2019</a:t>
+              <a:t>12.09.2019</a:t>
             </a:fld>
             <a:endParaRPr lang="de-DE"/>
           </a:p>
@@ -3313,7 +3319,7 @@
           <a:p>
             <a:fld id="{55B6B420-1CC8-400D-8A09-0509FF2B3B78}" type="datetimeFigureOut">
               <a:rPr lang="de-DE" smtClean="0"/>
-              <a:t>11.09.2019</a:t>
+              <a:t>12.09.2019</a:t>
             </a:fld>
             <a:endParaRPr lang="de-DE"/>
           </a:p>
@@ -3437,7 +3443,7 @@
           <a:p>
             <a:fld id="{55B6B420-1CC8-400D-8A09-0509FF2B3B78}" type="datetimeFigureOut">
               <a:rPr lang="de-DE" smtClean="0"/>
-              <a:t>11.09.2019</a:t>
+              <a:t>12.09.2019</a:t>
             </a:fld>
             <a:endParaRPr lang="de-DE"/>
           </a:p>
@@ -3533,7 +3539,7 @@
           <a:p>
             <a:fld id="{55B6B420-1CC8-400D-8A09-0509FF2B3B78}" type="datetimeFigureOut">
               <a:rPr lang="de-DE" smtClean="0"/>
-              <a:t>11.09.2019</a:t>
+              <a:t>12.09.2019</a:t>
             </a:fld>
             <a:endParaRPr lang="de-DE"/>
           </a:p>
@@ -3823,7 +3829,7 @@
           <a:p>
             <a:fld id="{55B6B420-1CC8-400D-8A09-0509FF2B3B78}" type="datetimeFigureOut">
               <a:rPr lang="de-DE" smtClean="0"/>
-              <a:t>11.09.2019</a:t>
+              <a:t>12.09.2019</a:t>
             </a:fld>
             <a:endParaRPr lang="de-DE"/>
           </a:p>
@@ -4080,7 +4086,7 @@
           <a:p>
             <a:fld id="{55B6B420-1CC8-400D-8A09-0509FF2B3B78}" type="datetimeFigureOut">
               <a:rPr lang="de-DE" smtClean="0"/>
-              <a:t>11.09.2019</a:t>
+              <a:t>12.09.2019</a:t>
             </a:fld>
             <a:endParaRPr lang="de-DE"/>
           </a:p>
@@ -4292,7 +4298,7 @@
           <a:p>
             <a:fld id="{55B6B420-1CC8-400D-8A09-0509FF2B3B78}" type="datetimeFigureOut">
               <a:rPr lang="de-DE" smtClean="0"/>
-              <a:t>11.09.2019</a:t>
+              <a:t>12.09.2019</a:t>
             </a:fld>
             <a:endParaRPr lang="de-DE"/>
           </a:p>
@@ -4941,6 +4947,1007 @@
 </p:sld>
 </file>
 
+<file path=ppt/slides/slide10.xml><?xml version="1.0" encoding="utf-8"?>
+<p:sld xmlns:a="http://schemas.openxmlformats.org/drawingml/2006/main" xmlns:r="http://schemas.openxmlformats.org/officeDocument/2006/relationships" xmlns:p="http://schemas.openxmlformats.org/presentationml/2006/main">
+  <p:cSld>
+    <p:spTree>
+      <p:nvGrpSpPr>
+        <p:cNvPr id="1" name=""/>
+        <p:cNvGrpSpPr/>
+        <p:nvPr/>
+      </p:nvGrpSpPr>
+      <p:grpSpPr>
+        <a:xfrm>
+          <a:off x="0" y="0"/>
+          <a:ext cx="0" cy="0"/>
+          <a:chOff x="0" y="0"/>
+          <a:chExt cx="0" cy="0"/>
+        </a:xfrm>
+      </p:grpSpPr>
+      <p:sp>
+        <p:nvSpPr>
+          <p:cNvPr id="2" name="Titel 1"/>
+          <p:cNvSpPr>
+            <a:spLocks noGrp="1"/>
+          </p:cNvSpPr>
+          <p:nvPr>
+            <p:ph type="title"/>
+          </p:nvPr>
+        </p:nvSpPr>
+        <p:spPr/>
+        <p:txBody>
+          <a:bodyPr/>
+          <a:lstStyle/>
+          <a:p>
+            <a:r>
+              <a:rPr lang="de-DE" dirty="0" smtClean="0"/>
+              <a:t>Analysis - </a:t>
+            </a:r>
+            <a:r>
+              <a:rPr lang="de-DE" dirty="0" err="1" smtClean="0"/>
+              <a:t>Results</a:t>
+            </a:r>
+            <a:endParaRPr lang="de-DE" dirty="0"/>
+          </a:p>
+        </p:txBody>
+      </p:sp>
+      <p:sp>
+        <p:nvSpPr>
+          <p:cNvPr id="3" name="Inhaltsplatzhalter 2"/>
+          <p:cNvSpPr>
+            <a:spLocks noGrp="1"/>
+          </p:cNvSpPr>
+          <p:nvPr>
+            <p:ph idx="1"/>
+          </p:nvPr>
+        </p:nvSpPr>
+        <p:spPr/>
+        <p:txBody>
+          <a:bodyPr/>
+          <a:lstStyle/>
+          <a:p>
+            <a:r>
+              <a:rPr lang="de-DE" dirty="0" err="1" smtClean="0"/>
+              <a:t>What</a:t>
+            </a:r>
+            <a:r>
+              <a:rPr lang="de-DE" dirty="0" smtClean="0"/>
+              <a:t> </a:t>
+            </a:r>
+            <a:r>
+              <a:rPr lang="de-DE" dirty="0" err="1" smtClean="0"/>
+              <a:t>we</a:t>
+            </a:r>
+            <a:r>
+              <a:rPr lang="de-DE" dirty="0" smtClean="0"/>
+              <a:t> </a:t>
+            </a:r>
+            <a:r>
+              <a:rPr lang="de-DE" dirty="0" err="1" smtClean="0"/>
+              <a:t>found</a:t>
+            </a:r>
+            <a:r>
+              <a:rPr lang="de-DE" dirty="0"/>
+              <a:t> </a:t>
+            </a:r>
+            <a:r>
+              <a:rPr lang="de-DE" dirty="0" smtClean="0"/>
+              <a:t>plus all </a:t>
+            </a:r>
+            <a:r>
+              <a:rPr lang="de-DE" dirty="0" err="1" smtClean="0"/>
+              <a:t>the</a:t>
+            </a:r>
+            <a:r>
+              <a:rPr lang="de-DE" dirty="0" smtClean="0"/>
+              <a:t> </a:t>
+            </a:r>
+            <a:r>
+              <a:rPr lang="de-DE" dirty="0" err="1" smtClean="0"/>
+              <a:t>graphs</a:t>
+            </a:r>
+            <a:endParaRPr lang="de-DE" dirty="0"/>
+          </a:p>
+        </p:txBody>
+      </p:sp>
+      <p:sp>
+        <p:nvSpPr>
+          <p:cNvPr id="4" name="Datumsplatzhalter 3"/>
+          <p:cNvSpPr>
+            <a:spLocks noGrp="1"/>
+          </p:cNvSpPr>
+          <p:nvPr>
+            <p:ph type="dt" sz="half" idx="10"/>
+          </p:nvPr>
+        </p:nvSpPr>
+        <p:spPr/>
+        <p:txBody>
+          <a:bodyPr/>
+          <a:lstStyle/>
+          <a:p>
+            <a:fld id="{CED01FEC-FB6E-4B13-A979-02991338105D}" type="datetime1">
+              <a:rPr lang="de-DE" smtClean="0"/>
+              <a:t>12.09.2019</a:t>
+            </a:fld>
+            <a:endParaRPr lang="de-DE"/>
+          </a:p>
+        </p:txBody>
+      </p:sp>
+      <p:sp>
+        <p:nvSpPr>
+          <p:cNvPr id="5" name="Fußzeilenplatzhalter 4"/>
+          <p:cNvSpPr>
+            <a:spLocks noGrp="1"/>
+          </p:cNvSpPr>
+          <p:nvPr>
+            <p:ph type="ftr" sz="quarter" idx="11"/>
+          </p:nvPr>
+        </p:nvSpPr>
+        <p:spPr/>
+        <p:txBody>
+          <a:bodyPr/>
+          <a:lstStyle/>
+          <a:p>
+            <a:endParaRPr lang="de-DE"/>
+          </a:p>
+        </p:txBody>
+      </p:sp>
+      <p:sp>
+        <p:nvSpPr>
+          <p:cNvPr id="6" name="Foliennummernplatzhalter 5"/>
+          <p:cNvSpPr>
+            <a:spLocks noGrp="1"/>
+          </p:cNvSpPr>
+          <p:nvPr>
+            <p:ph type="sldNum" sz="quarter" idx="12"/>
+          </p:nvPr>
+        </p:nvSpPr>
+        <p:spPr/>
+        <p:txBody>
+          <a:bodyPr/>
+          <a:lstStyle/>
+          <a:p>
+            <a:fld id="{1A59CD77-CAB0-4B8E-89CD-FC7476DE0784}" type="slidenum">
+              <a:rPr lang="de-DE" smtClean="0"/>
+              <a:t>10</a:t>
+            </a:fld>
+            <a:endParaRPr lang="de-DE"/>
+          </a:p>
+        </p:txBody>
+      </p:sp>
+    </p:spTree>
+    <p:extLst>
+      <p:ext uri="{BB962C8B-B14F-4D97-AF65-F5344CB8AC3E}">
+        <p14:creationId xmlns:p14="http://schemas.microsoft.com/office/powerpoint/2010/main" val="682472445"/>
+      </p:ext>
+    </p:extLst>
+  </p:cSld>
+  <p:clrMapOvr>
+    <a:masterClrMapping/>
+  </p:clrMapOvr>
+</p:sld>
+</file>
+
+<file path=ppt/slides/slide11.xml><?xml version="1.0" encoding="utf-8"?>
+<p:sld xmlns:a="http://schemas.openxmlformats.org/drawingml/2006/main" xmlns:r="http://schemas.openxmlformats.org/officeDocument/2006/relationships" xmlns:p="http://schemas.openxmlformats.org/presentationml/2006/main">
+  <p:cSld>
+    <p:spTree>
+      <p:nvGrpSpPr>
+        <p:cNvPr id="1" name=""/>
+        <p:cNvGrpSpPr/>
+        <p:nvPr/>
+      </p:nvGrpSpPr>
+      <p:grpSpPr>
+        <a:xfrm>
+          <a:off x="0" y="0"/>
+          <a:ext cx="0" cy="0"/>
+          <a:chOff x="0" y="0"/>
+          <a:chExt cx="0" cy="0"/>
+        </a:xfrm>
+      </p:grpSpPr>
+      <p:sp>
+        <p:nvSpPr>
+          <p:cNvPr id="2" name="Titel 1"/>
+          <p:cNvSpPr>
+            <a:spLocks noGrp="1"/>
+          </p:cNvSpPr>
+          <p:nvPr>
+            <p:ph type="title"/>
+          </p:nvPr>
+        </p:nvSpPr>
+        <p:spPr/>
+        <p:txBody>
+          <a:bodyPr/>
+          <a:lstStyle/>
+          <a:p>
+            <a:r>
+              <a:rPr lang="de-DE" dirty="0" err="1" smtClean="0"/>
+              <a:t>Conclusion</a:t>
+            </a:r>
+            <a:endParaRPr lang="de-DE" dirty="0"/>
+          </a:p>
+        </p:txBody>
+      </p:sp>
+      <p:sp>
+        <p:nvSpPr>
+          <p:cNvPr id="3" name="Inhaltsplatzhalter 2"/>
+          <p:cNvSpPr>
+            <a:spLocks noGrp="1"/>
+          </p:cNvSpPr>
+          <p:nvPr>
+            <p:ph idx="1"/>
+          </p:nvPr>
+        </p:nvSpPr>
+        <p:spPr/>
+        <p:txBody>
+          <a:bodyPr/>
+          <a:lstStyle/>
+          <a:p>
+            <a:r>
+              <a:rPr lang="de-DE" dirty="0" err="1" smtClean="0"/>
+              <a:t>Is</a:t>
+            </a:r>
+            <a:r>
+              <a:rPr lang="de-DE" dirty="0" smtClean="0"/>
+              <a:t> </a:t>
+            </a:r>
+            <a:r>
+              <a:rPr lang="de-DE" dirty="0" err="1" smtClean="0"/>
+              <a:t>it</a:t>
+            </a:r>
+            <a:r>
+              <a:rPr lang="de-DE" dirty="0" smtClean="0"/>
+              <a:t> </a:t>
+            </a:r>
+            <a:r>
+              <a:rPr lang="de-DE" dirty="0" err="1" smtClean="0"/>
+              <a:t>safe</a:t>
+            </a:r>
+            <a:r>
+              <a:rPr lang="de-DE" dirty="0" smtClean="0"/>
+              <a:t> </a:t>
+            </a:r>
+            <a:r>
+              <a:rPr lang="de-DE" dirty="0" err="1" smtClean="0"/>
+              <a:t>against</a:t>
+            </a:r>
+            <a:r>
+              <a:rPr lang="de-DE" dirty="0" smtClean="0"/>
+              <a:t> </a:t>
+            </a:r>
+            <a:r>
+              <a:rPr lang="de-DE" dirty="0" err="1" smtClean="0"/>
+              <a:t>the</a:t>
+            </a:r>
+            <a:r>
+              <a:rPr lang="de-DE" dirty="0" smtClean="0"/>
+              <a:t> </a:t>
+            </a:r>
+            <a:r>
+              <a:rPr lang="de-DE" dirty="0" err="1" smtClean="0"/>
+              <a:t>Rightful</a:t>
+            </a:r>
+            <a:r>
+              <a:rPr lang="de-DE" dirty="0" smtClean="0"/>
+              <a:t> Ownership Problem &amp; </a:t>
+            </a:r>
+            <a:r>
+              <a:rPr lang="de-DE" dirty="0" err="1" smtClean="0"/>
+              <a:t>the</a:t>
+            </a:r>
+            <a:r>
+              <a:rPr lang="de-DE" dirty="0" smtClean="0"/>
+              <a:t> </a:t>
+            </a:r>
+            <a:r>
+              <a:rPr lang="de-DE" dirty="0" err="1" smtClean="0"/>
+              <a:t>Attacker</a:t>
+            </a:r>
+            <a:r>
+              <a:rPr lang="de-DE" dirty="0" smtClean="0"/>
+              <a:t> </a:t>
+            </a:r>
+            <a:r>
+              <a:rPr lang="de-DE" dirty="0" err="1" smtClean="0"/>
+              <a:t>with</a:t>
+            </a:r>
+            <a:r>
+              <a:rPr lang="de-DE" dirty="0" smtClean="0"/>
+              <a:t> multiple </a:t>
+            </a:r>
+            <a:r>
+              <a:rPr lang="de-DE" dirty="0" err="1" smtClean="0"/>
+              <a:t>public</a:t>
+            </a:r>
+            <a:r>
+              <a:rPr lang="de-DE" dirty="0" smtClean="0"/>
+              <a:t> </a:t>
+            </a:r>
+            <a:r>
+              <a:rPr lang="de-DE" dirty="0" err="1" smtClean="0"/>
+              <a:t>images</a:t>
+            </a:r>
+            <a:r>
+              <a:rPr lang="de-DE" dirty="0" smtClean="0"/>
+              <a:t>?</a:t>
+            </a:r>
+          </a:p>
+          <a:p>
+            <a:r>
+              <a:rPr lang="de-DE" dirty="0" err="1" smtClean="0"/>
+              <a:t>Is</a:t>
+            </a:r>
+            <a:r>
+              <a:rPr lang="de-DE" dirty="0" smtClean="0"/>
+              <a:t> </a:t>
+            </a:r>
+            <a:r>
+              <a:rPr lang="de-DE" dirty="0" err="1" smtClean="0"/>
+              <a:t>is</a:t>
+            </a:r>
+            <a:r>
+              <a:rPr lang="de-DE" dirty="0" smtClean="0"/>
+              <a:t> </a:t>
+            </a:r>
+            <a:r>
+              <a:rPr lang="de-DE" dirty="0" err="1" smtClean="0"/>
+              <a:t>safe</a:t>
+            </a:r>
+            <a:r>
+              <a:rPr lang="de-DE" dirty="0" smtClean="0"/>
+              <a:t> in </a:t>
+            </a:r>
+            <a:r>
+              <a:rPr lang="de-DE" dirty="0" err="1" smtClean="0"/>
+              <a:t>general</a:t>
+            </a:r>
+            <a:r>
+              <a:rPr lang="de-DE" dirty="0" smtClean="0"/>
+              <a:t>/ </a:t>
+            </a:r>
+            <a:r>
+              <a:rPr lang="de-DE" dirty="0" err="1" smtClean="0"/>
+              <a:t>against</a:t>
+            </a:r>
+            <a:r>
+              <a:rPr lang="de-DE" dirty="0" smtClean="0"/>
+              <a:t> </a:t>
+            </a:r>
+            <a:r>
+              <a:rPr lang="de-DE" dirty="0" err="1" smtClean="0"/>
+              <a:t>other</a:t>
+            </a:r>
+            <a:r>
+              <a:rPr lang="de-DE" dirty="0" smtClean="0"/>
+              <a:t> </a:t>
+            </a:r>
+            <a:r>
+              <a:rPr lang="de-DE" dirty="0" err="1" smtClean="0"/>
+              <a:t>attacks</a:t>
+            </a:r>
+            <a:r>
+              <a:rPr lang="de-DE" dirty="0" smtClean="0"/>
+              <a:t>?</a:t>
+            </a:r>
+          </a:p>
+          <a:p>
+            <a:r>
+              <a:rPr lang="de-DE" dirty="0" err="1" smtClean="0"/>
+              <a:t>Strenghts</a:t>
+            </a:r>
+            <a:r>
+              <a:rPr lang="de-DE" dirty="0" smtClean="0"/>
+              <a:t> </a:t>
+            </a:r>
+            <a:r>
+              <a:rPr lang="de-DE" dirty="0" err="1" smtClean="0"/>
+              <a:t>and</a:t>
+            </a:r>
+            <a:r>
+              <a:rPr lang="de-DE" dirty="0" smtClean="0"/>
+              <a:t> </a:t>
+            </a:r>
+            <a:r>
+              <a:rPr lang="de-DE" dirty="0" err="1" smtClean="0"/>
+              <a:t>weaknesses</a:t>
+            </a:r>
+            <a:r>
+              <a:rPr lang="de-DE" dirty="0" smtClean="0"/>
+              <a:t> </a:t>
+            </a:r>
+            <a:r>
+              <a:rPr lang="de-DE" dirty="0" err="1" smtClean="0"/>
+              <a:t>of</a:t>
+            </a:r>
+            <a:r>
+              <a:rPr lang="de-DE" dirty="0" smtClean="0"/>
+              <a:t> </a:t>
+            </a:r>
+            <a:r>
+              <a:rPr lang="de-DE" dirty="0" err="1" smtClean="0"/>
+              <a:t>our</a:t>
+            </a:r>
+            <a:r>
+              <a:rPr lang="de-DE" dirty="0" smtClean="0"/>
+              <a:t> </a:t>
+            </a:r>
+            <a:r>
+              <a:rPr lang="de-DE" dirty="0" err="1" smtClean="0"/>
+              <a:t>wm</a:t>
+            </a:r>
+            <a:r>
+              <a:rPr lang="de-DE" dirty="0" smtClean="0"/>
+              <a:t> </a:t>
+            </a:r>
+            <a:r>
+              <a:rPr lang="de-DE" dirty="0" err="1" smtClean="0"/>
+              <a:t>system</a:t>
+            </a:r>
+            <a:endParaRPr lang="de-DE" dirty="0" smtClean="0"/>
+          </a:p>
+          <a:p>
+            <a:r>
+              <a:rPr lang="de-DE" dirty="0" err="1" smtClean="0"/>
+              <a:t>How</a:t>
+            </a:r>
+            <a:r>
+              <a:rPr lang="de-DE" dirty="0" smtClean="0"/>
+              <a:t> </a:t>
+            </a:r>
+            <a:r>
+              <a:rPr lang="de-DE" dirty="0" err="1" smtClean="0"/>
+              <a:t>good</a:t>
+            </a:r>
+            <a:r>
+              <a:rPr lang="de-DE" dirty="0" smtClean="0"/>
+              <a:t> </a:t>
+            </a:r>
+            <a:r>
+              <a:rPr lang="de-DE" dirty="0" err="1" smtClean="0"/>
+              <a:t>are</a:t>
+            </a:r>
+            <a:r>
+              <a:rPr lang="de-DE" dirty="0" smtClean="0"/>
+              <a:t> </a:t>
+            </a:r>
+            <a:r>
+              <a:rPr lang="de-DE" dirty="0" err="1" smtClean="0"/>
+              <a:t>our</a:t>
+            </a:r>
+            <a:r>
+              <a:rPr lang="de-DE" dirty="0" smtClean="0"/>
+              <a:t> </a:t>
+            </a:r>
+            <a:r>
+              <a:rPr lang="de-DE" dirty="0" err="1" smtClean="0"/>
+              <a:t>results</a:t>
+            </a:r>
+            <a:r>
+              <a:rPr lang="de-DE" dirty="0" smtClean="0"/>
+              <a:t>/</a:t>
+            </a:r>
+            <a:r>
+              <a:rPr lang="de-DE" dirty="0" err="1" smtClean="0"/>
+              <a:t>limitations</a:t>
+            </a:r>
+            <a:endParaRPr lang="de-DE" dirty="0" smtClean="0"/>
+          </a:p>
+          <a:p>
+            <a:r>
+              <a:rPr lang="de-DE" dirty="0" smtClean="0"/>
+              <a:t>Etc.</a:t>
+            </a:r>
+            <a:endParaRPr lang="de-DE" dirty="0"/>
+          </a:p>
+        </p:txBody>
+      </p:sp>
+      <p:sp>
+        <p:nvSpPr>
+          <p:cNvPr id="4" name="Datumsplatzhalter 3"/>
+          <p:cNvSpPr>
+            <a:spLocks noGrp="1"/>
+          </p:cNvSpPr>
+          <p:nvPr>
+            <p:ph type="dt" sz="half" idx="10"/>
+          </p:nvPr>
+        </p:nvSpPr>
+        <p:spPr/>
+        <p:txBody>
+          <a:bodyPr/>
+          <a:lstStyle/>
+          <a:p>
+            <a:fld id="{E85CEE0D-6705-4CC0-8D5F-FF6F3FE04351}" type="datetime1">
+              <a:rPr lang="de-DE" smtClean="0"/>
+              <a:t>12.09.2019</a:t>
+            </a:fld>
+            <a:endParaRPr lang="de-DE"/>
+          </a:p>
+        </p:txBody>
+      </p:sp>
+      <p:sp>
+        <p:nvSpPr>
+          <p:cNvPr id="5" name="Fußzeilenplatzhalter 4"/>
+          <p:cNvSpPr>
+            <a:spLocks noGrp="1"/>
+          </p:cNvSpPr>
+          <p:nvPr>
+            <p:ph type="ftr" sz="quarter" idx="11"/>
+          </p:nvPr>
+        </p:nvSpPr>
+        <p:spPr/>
+        <p:txBody>
+          <a:bodyPr/>
+          <a:lstStyle/>
+          <a:p>
+            <a:endParaRPr lang="de-DE"/>
+          </a:p>
+        </p:txBody>
+      </p:sp>
+      <p:sp>
+        <p:nvSpPr>
+          <p:cNvPr id="6" name="Foliennummernplatzhalter 5"/>
+          <p:cNvSpPr>
+            <a:spLocks noGrp="1"/>
+          </p:cNvSpPr>
+          <p:nvPr>
+            <p:ph type="sldNum" sz="quarter" idx="12"/>
+          </p:nvPr>
+        </p:nvSpPr>
+        <p:spPr/>
+        <p:txBody>
+          <a:bodyPr/>
+          <a:lstStyle/>
+          <a:p>
+            <a:fld id="{1A59CD77-CAB0-4B8E-89CD-FC7476DE0784}" type="slidenum">
+              <a:rPr lang="de-DE" smtClean="0"/>
+              <a:t>11</a:t>
+            </a:fld>
+            <a:endParaRPr lang="de-DE"/>
+          </a:p>
+        </p:txBody>
+      </p:sp>
+    </p:spTree>
+    <p:extLst>
+      <p:ext uri="{BB962C8B-B14F-4D97-AF65-F5344CB8AC3E}">
+        <p14:creationId xmlns:p14="http://schemas.microsoft.com/office/powerpoint/2010/main" val="212958236"/>
+      </p:ext>
+    </p:extLst>
+  </p:cSld>
+  <p:clrMapOvr>
+    <a:masterClrMapping/>
+  </p:clrMapOvr>
+</p:sld>
+</file>
+
+<file path=ppt/slides/slide12.xml><?xml version="1.0" encoding="utf-8"?>
+<p:sld xmlns:a="http://schemas.openxmlformats.org/drawingml/2006/main" xmlns:r="http://schemas.openxmlformats.org/officeDocument/2006/relationships" xmlns:p="http://schemas.openxmlformats.org/presentationml/2006/main">
+  <p:cSld>
+    <p:spTree>
+      <p:nvGrpSpPr>
+        <p:cNvPr id="1" name=""/>
+        <p:cNvGrpSpPr/>
+        <p:nvPr/>
+      </p:nvGrpSpPr>
+      <p:grpSpPr>
+        <a:xfrm>
+          <a:off x="0" y="0"/>
+          <a:ext cx="0" cy="0"/>
+          <a:chOff x="0" y="0"/>
+          <a:chExt cx="0" cy="0"/>
+        </a:xfrm>
+      </p:grpSpPr>
+      <p:sp>
+        <p:nvSpPr>
+          <p:cNvPr id="2" name="Titel 1"/>
+          <p:cNvSpPr>
+            <a:spLocks noGrp="1"/>
+          </p:cNvSpPr>
+          <p:nvPr>
+            <p:ph type="ctrTitle"/>
+          </p:nvPr>
+        </p:nvSpPr>
+        <p:spPr/>
+        <p:txBody>
+          <a:bodyPr/>
+          <a:lstStyle/>
+          <a:p>
+            <a:r>
+              <a:rPr lang="de-DE" dirty="0" err="1" smtClean="0"/>
+              <a:t>Any</a:t>
+            </a:r>
+            <a:r>
+              <a:rPr lang="de-DE" dirty="0" smtClean="0"/>
+              <a:t> </a:t>
+            </a:r>
+            <a:r>
+              <a:rPr lang="de-DE" dirty="0" err="1" smtClean="0"/>
+              <a:t>questions</a:t>
+            </a:r>
+            <a:r>
+              <a:rPr lang="de-DE" dirty="0" smtClean="0"/>
+              <a:t>?</a:t>
+            </a:r>
+            <a:endParaRPr lang="de-DE" dirty="0"/>
+          </a:p>
+        </p:txBody>
+      </p:sp>
+      <p:sp>
+        <p:nvSpPr>
+          <p:cNvPr id="3" name="Untertitel 2"/>
+          <p:cNvSpPr>
+            <a:spLocks noGrp="1"/>
+          </p:cNvSpPr>
+          <p:nvPr>
+            <p:ph type="subTitle" idx="1"/>
+          </p:nvPr>
+        </p:nvSpPr>
+        <p:spPr/>
+        <p:txBody>
+          <a:bodyPr/>
+          <a:lstStyle/>
+          <a:p>
+            <a:r>
+              <a:rPr lang="de-DE" dirty="0" err="1" smtClean="0"/>
+              <a:t>Thank</a:t>
+            </a:r>
+            <a:r>
+              <a:rPr lang="de-DE" dirty="0" smtClean="0"/>
+              <a:t> </a:t>
+            </a:r>
+            <a:r>
+              <a:rPr lang="de-DE" dirty="0" err="1" smtClean="0"/>
+              <a:t>you</a:t>
+            </a:r>
+            <a:r>
+              <a:rPr lang="de-DE" dirty="0" smtClean="0"/>
+              <a:t> </a:t>
+            </a:r>
+            <a:r>
+              <a:rPr lang="de-DE" dirty="0" err="1" smtClean="0"/>
+              <a:t>for</a:t>
+            </a:r>
+            <a:r>
+              <a:rPr lang="de-DE" dirty="0" smtClean="0"/>
+              <a:t> </a:t>
+            </a:r>
+            <a:r>
+              <a:rPr lang="de-DE" dirty="0" err="1" smtClean="0"/>
+              <a:t>your</a:t>
+            </a:r>
+            <a:r>
+              <a:rPr lang="de-DE" dirty="0" smtClean="0"/>
+              <a:t> </a:t>
+            </a:r>
+            <a:r>
+              <a:rPr lang="de-DE" dirty="0" err="1" smtClean="0"/>
+              <a:t>attention</a:t>
+            </a:r>
+            <a:r>
+              <a:rPr lang="de-DE" dirty="0" smtClean="0"/>
+              <a:t>.</a:t>
+            </a:r>
+            <a:endParaRPr lang="de-DE" dirty="0"/>
+          </a:p>
+        </p:txBody>
+      </p:sp>
+      <p:sp>
+        <p:nvSpPr>
+          <p:cNvPr id="4" name="Datumsplatzhalter 3"/>
+          <p:cNvSpPr>
+            <a:spLocks noGrp="1"/>
+          </p:cNvSpPr>
+          <p:nvPr>
+            <p:ph type="dt" sz="half" idx="10"/>
+          </p:nvPr>
+        </p:nvSpPr>
+        <p:spPr/>
+        <p:txBody>
+          <a:bodyPr/>
+          <a:lstStyle/>
+          <a:p>
+            <a:fld id="{EA3FB193-2B16-4358-BE54-B64F1A382B08}" type="datetime1">
+              <a:rPr lang="de-DE" smtClean="0"/>
+              <a:t>12.09.2019</a:t>
+            </a:fld>
+            <a:endParaRPr lang="de-DE"/>
+          </a:p>
+        </p:txBody>
+      </p:sp>
+      <p:sp>
+        <p:nvSpPr>
+          <p:cNvPr id="5" name="Fußzeilenplatzhalter 4"/>
+          <p:cNvSpPr>
+            <a:spLocks noGrp="1"/>
+          </p:cNvSpPr>
+          <p:nvPr>
+            <p:ph type="ftr" sz="quarter" idx="11"/>
+          </p:nvPr>
+        </p:nvSpPr>
+        <p:spPr/>
+        <p:txBody>
+          <a:bodyPr/>
+          <a:lstStyle/>
+          <a:p>
+            <a:endParaRPr lang="de-DE"/>
+          </a:p>
+        </p:txBody>
+      </p:sp>
+      <p:sp>
+        <p:nvSpPr>
+          <p:cNvPr id="6" name="Foliennummernplatzhalter 5"/>
+          <p:cNvSpPr>
+            <a:spLocks noGrp="1"/>
+          </p:cNvSpPr>
+          <p:nvPr>
+            <p:ph type="sldNum" sz="quarter" idx="12"/>
+          </p:nvPr>
+        </p:nvSpPr>
+        <p:spPr/>
+        <p:txBody>
+          <a:bodyPr/>
+          <a:lstStyle/>
+          <a:p>
+            <a:fld id="{1A59CD77-CAB0-4B8E-89CD-FC7476DE0784}" type="slidenum">
+              <a:rPr lang="de-DE" smtClean="0"/>
+              <a:t>12</a:t>
+            </a:fld>
+            <a:endParaRPr lang="de-DE"/>
+          </a:p>
+        </p:txBody>
+      </p:sp>
+    </p:spTree>
+    <p:extLst>
+      <p:ext uri="{BB962C8B-B14F-4D97-AF65-F5344CB8AC3E}">
+        <p14:creationId xmlns:p14="http://schemas.microsoft.com/office/powerpoint/2010/main" val="2554040092"/>
+      </p:ext>
+    </p:extLst>
+  </p:cSld>
+  <p:clrMapOvr>
+    <a:masterClrMapping/>
+  </p:clrMapOvr>
+</p:sld>
+</file>
+
+<file path=ppt/slides/slide13.xml><?xml version="1.0" encoding="utf-8"?>
+<p:sld xmlns:a="http://schemas.openxmlformats.org/drawingml/2006/main" xmlns:r="http://schemas.openxmlformats.org/officeDocument/2006/relationships" xmlns:p="http://schemas.openxmlformats.org/presentationml/2006/main">
+  <p:cSld>
+    <p:spTree>
+      <p:nvGrpSpPr>
+        <p:cNvPr id="1" name=""/>
+        <p:cNvGrpSpPr/>
+        <p:nvPr/>
+      </p:nvGrpSpPr>
+      <p:grpSpPr>
+        <a:xfrm>
+          <a:off x="0" y="0"/>
+          <a:ext cx="0" cy="0"/>
+          <a:chOff x="0" y="0"/>
+          <a:chExt cx="0" cy="0"/>
+        </a:xfrm>
+      </p:grpSpPr>
+      <p:sp>
+        <p:nvSpPr>
+          <p:cNvPr id="2" name="Titel 1"/>
+          <p:cNvSpPr>
+            <a:spLocks noGrp="1"/>
+          </p:cNvSpPr>
+          <p:nvPr>
+            <p:ph type="title"/>
+          </p:nvPr>
+        </p:nvSpPr>
+        <p:spPr/>
+        <p:txBody>
+          <a:bodyPr/>
+          <a:lstStyle/>
+          <a:p>
+            <a:r>
+              <a:rPr lang="de-DE" dirty="0" smtClean="0"/>
+              <a:t>References</a:t>
+            </a:r>
+            <a:endParaRPr lang="de-DE" dirty="0"/>
+          </a:p>
+        </p:txBody>
+      </p:sp>
+      <p:sp>
+        <p:nvSpPr>
+          <p:cNvPr id="3" name="Inhaltsplatzhalter 2"/>
+          <p:cNvSpPr>
+            <a:spLocks noGrp="1"/>
+          </p:cNvSpPr>
+          <p:nvPr>
+            <p:ph idx="1"/>
+          </p:nvPr>
+        </p:nvSpPr>
+        <p:spPr/>
+        <p:txBody>
+          <a:bodyPr/>
+          <a:lstStyle/>
+          <a:p>
+            <a:r>
+              <a:rPr lang="de-DE" dirty="0" err="1" smtClean="0"/>
+              <a:t>Lecture</a:t>
+            </a:r>
+            <a:r>
+              <a:rPr lang="de-DE" dirty="0" smtClean="0"/>
+              <a:t> </a:t>
+            </a:r>
+            <a:r>
+              <a:rPr lang="de-DE" dirty="0" err="1" smtClean="0"/>
+              <a:t>notes</a:t>
+            </a:r>
+            <a:r>
+              <a:rPr lang="de-DE" dirty="0" smtClean="0"/>
+              <a:t> „Digital </a:t>
+            </a:r>
+            <a:r>
+              <a:rPr lang="de-DE" dirty="0" err="1" smtClean="0"/>
+              <a:t>Watermarking</a:t>
+            </a:r>
+            <a:r>
+              <a:rPr lang="de-DE" dirty="0" smtClean="0"/>
+              <a:t> </a:t>
+            </a:r>
+            <a:r>
+              <a:rPr lang="de-DE" dirty="0" err="1" smtClean="0"/>
+              <a:t>and</a:t>
+            </a:r>
+            <a:r>
+              <a:rPr lang="de-DE" dirty="0" smtClean="0"/>
+              <a:t> </a:t>
+            </a:r>
+            <a:r>
+              <a:rPr lang="de-DE" dirty="0" err="1" smtClean="0"/>
+              <a:t>Steganography</a:t>
+            </a:r>
+            <a:r>
+              <a:rPr lang="de-DE" dirty="0" smtClean="0"/>
+              <a:t> </a:t>
+            </a:r>
+            <a:r>
+              <a:rPr lang="de-DE" dirty="0" err="1" smtClean="0"/>
+              <a:t>SoSe</a:t>
+            </a:r>
+            <a:r>
+              <a:rPr lang="de-DE" dirty="0" smtClean="0"/>
+              <a:t> 2019“, Andreas </a:t>
+            </a:r>
+            <a:r>
+              <a:rPr lang="de-DE" dirty="0" err="1" smtClean="0"/>
+              <a:t>Jakoby</a:t>
+            </a:r>
+            <a:r>
+              <a:rPr lang="de-DE" dirty="0" smtClean="0"/>
+              <a:t>, Bauhaus University Weimar</a:t>
+            </a:r>
+          </a:p>
+          <a:p>
+            <a:r>
+              <a:rPr lang="en-US" dirty="0"/>
+              <a:t>Craver, Scott &amp; </a:t>
+            </a:r>
+            <a:r>
+              <a:rPr lang="en-US" dirty="0" err="1"/>
+              <a:t>Memon</a:t>
+            </a:r>
+            <a:r>
+              <a:rPr lang="en-US" dirty="0"/>
+              <a:t>, Nasir &amp; Yeo, Boon-Lock &amp; Yeung, Minerva. (1997). On The </a:t>
+            </a:r>
+            <a:r>
+              <a:rPr lang="en-US" dirty="0" err="1"/>
+              <a:t>Invertibility</a:t>
+            </a:r>
+            <a:r>
+              <a:rPr lang="en-US" dirty="0"/>
+              <a:t> Of Invisible Watermarking </a:t>
+            </a:r>
+            <a:r>
+              <a:rPr lang="en-US" dirty="0" smtClean="0"/>
+              <a:t>Techniques</a:t>
+            </a:r>
+            <a:r>
+              <a:rPr lang="en-US" dirty="0"/>
+              <a:t>. 1. 540 - 543 vol.1. 10.1109/ICIP.1997.647969. </a:t>
+            </a:r>
+            <a:endParaRPr lang="en-US" dirty="0" smtClean="0"/>
+          </a:p>
+          <a:p>
+            <a:r>
+              <a:rPr lang="en-US" dirty="0" smtClean="0"/>
+              <a:t>Python 3.7</a:t>
+            </a:r>
+          </a:p>
+          <a:p>
+            <a:r>
+              <a:rPr lang="en-US" dirty="0" err="1" smtClean="0"/>
+              <a:t>Numpy</a:t>
+            </a:r>
+            <a:r>
+              <a:rPr lang="en-US" dirty="0" smtClean="0"/>
+              <a:t> 1.16</a:t>
+            </a:r>
+            <a:endParaRPr lang="de-DE" dirty="0"/>
+          </a:p>
+        </p:txBody>
+      </p:sp>
+      <p:sp>
+        <p:nvSpPr>
+          <p:cNvPr id="4" name="Datumsplatzhalter 3"/>
+          <p:cNvSpPr>
+            <a:spLocks noGrp="1"/>
+          </p:cNvSpPr>
+          <p:nvPr>
+            <p:ph type="dt" sz="half" idx="10"/>
+          </p:nvPr>
+        </p:nvSpPr>
+        <p:spPr/>
+        <p:txBody>
+          <a:bodyPr/>
+          <a:lstStyle/>
+          <a:p>
+            <a:fld id="{4DEBB585-5E70-4EE4-B161-23F1DD3D45C7}" type="datetime1">
+              <a:rPr lang="de-DE" smtClean="0"/>
+              <a:t>12.09.2019</a:t>
+            </a:fld>
+            <a:endParaRPr lang="de-DE"/>
+          </a:p>
+        </p:txBody>
+      </p:sp>
+      <p:sp>
+        <p:nvSpPr>
+          <p:cNvPr id="5" name="Fußzeilenplatzhalter 4"/>
+          <p:cNvSpPr>
+            <a:spLocks noGrp="1"/>
+          </p:cNvSpPr>
+          <p:nvPr>
+            <p:ph type="ftr" sz="quarter" idx="11"/>
+          </p:nvPr>
+        </p:nvSpPr>
+        <p:spPr/>
+        <p:txBody>
+          <a:bodyPr/>
+          <a:lstStyle/>
+          <a:p>
+            <a:endParaRPr lang="de-DE"/>
+          </a:p>
+        </p:txBody>
+      </p:sp>
+      <p:sp>
+        <p:nvSpPr>
+          <p:cNvPr id="6" name="Foliennummernplatzhalter 5"/>
+          <p:cNvSpPr>
+            <a:spLocks noGrp="1"/>
+          </p:cNvSpPr>
+          <p:nvPr>
+            <p:ph type="sldNum" sz="quarter" idx="12"/>
+          </p:nvPr>
+        </p:nvSpPr>
+        <p:spPr/>
+        <p:txBody>
+          <a:bodyPr/>
+          <a:lstStyle/>
+          <a:p>
+            <a:fld id="{1A59CD77-CAB0-4B8E-89CD-FC7476DE0784}" type="slidenum">
+              <a:rPr lang="de-DE" smtClean="0"/>
+              <a:t>13</a:t>
+            </a:fld>
+            <a:endParaRPr lang="de-DE"/>
+          </a:p>
+        </p:txBody>
+      </p:sp>
+    </p:spTree>
+    <p:extLst>
+      <p:ext uri="{BB962C8B-B14F-4D97-AF65-F5344CB8AC3E}">
+        <p14:creationId xmlns:p14="http://schemas.microsoft.com/office/powerpoint/2010/main" val="253311393"/>
+      </p:ext>
+    </p:extLst>
+  </p:cSld>
+  <p:clrMapOvr>
+    <a:masterClrMapping/>
+  </p:clrMapOvr>
+</p:sld>
+</file>
+
 <file path=ppt/slides/slide2.xml><?xml version="1.0" encoding="utf-8"?>
 <p:sld xmlns:a="http://schemas.openxmlformats.org/drawingml/2006/main" xmlns:r="http://schemas.openxmlformats.org/officeDocument/2006/relationships" xmlns:p="http://schemas.openxmlformats.org/presentationml/2006/main">
   <p:cSld>
@@ -5021,7 +6028,7 @@
           <a:p>
             <a:fld id="{0FEB06B0-EB9B-47EB-87FD-D32F23F1AF9B}" type="datetime1">
               <a:rPr lang="de-DE" smtClean="0"/>
-              <a:t>11.09.2019</a:t>
+              <a:t>12.09.2019</a:t>
             </a:fld>
             <a:endParaRPr lang="de-DE"/>
           </a:p>
@@ -5161,7 +6168,9 @@
         </p:nvSpPr>
         <p:spPr/>
         <p:txBody>
-          <a:bodyPr/>
+          <a:bodyPr>
+            <a:normAutofit lnSpcReduction="10000"/>
+          </a:bodyPr>
           <a:lstStyle/>
           <a:p>
             <a:r>
@@ -5349,19 +6358,11 @@
               <a:t> </a:t>
             </a:r>
             <a:r>
-              <a:rPr lang="de-DE" dirty="0" err="1"/>
-              <a:t>Cb</a:t>
-            </a:r>
-            <a:r>
-              <a:rPr lang="de-DE" dirty="0"/>
-              <a:t> </a:t>
-            </a:r>
-            <a:r>
-              <a:rPr lang="de-DE" dirty="0" err="1"/>
-              <a:t>colour</a:t>
-            </a:r>
-            <a:r>
-              <a:rPr lang="de-DE" dirty="0"/>
+              <a:rPr lang="de-DE" dirty="0" err="1" smtClean="0"/>
+              <a:t>Cb-colour</a:t>
+            </a:r>
+            <a:r>
+              <a:rPr lang="de-DE" dirty="0" smtClean="0"/>
               <a:t> </a:t>
             </a:r>
             <a:r>
@@ -5381,6 +6382,74 @@
               <a:t>: Takes </a:t>
             </a:r>
             <a:r>
+              <a:rPr lang="de-DE" dirty="0" err="1" smtClean="0"/>
+              <a:t>watermarked</a:t>
+            </a:r>
+            <a:r>
+              <a:rPr lang="de-DE" dirty="0" smtClean="0"/>
+              <a:t> </a:t>
+            </a:r>
+            <a:r>
+              <a:rPr lang="de-DE" dirty="0"/>
+              <a:t>&amp; original </a:t>
+            </a:r>
+            <a:r>
+              <a:rPr lang="de-DE" dirty="0" err="1" smtClean="0"/>
+              <a:t>image</a:t>
+            </a:r>
+            <a:r>
+              <a:rPr lang="de-DE" dirty="0" smtClean="0"/>
+              <a:t> </a:t>
+            </a:r>
+            <a:r>
+              <a:rPr lang="de-DE" dirty="0" err="1"/>
+              <a:t>and</a:t>
+            </a:r>
+            <a:r>
+              <a:rPr lang="de-DE" dirty="0"/>
+              <a:t> </a:t>
+            </a:r>
+            <a:r>
+              <a:rPr lang="de-DE" dirty="0" err="1"/>
+              <a:t>computes</a:t>
+            </a:r>
+            <a:r>
+              <a:rPr lang="de-DE" dirty="0"/>
+              <a:t> </a:t>
+            </a:r>
+            <a:r>
+              <a:rPr lang="de-DE" dirty="0" err="1"/>
+              <a:t>the</a:t>
+            </a:r>
+            <a:r>
+              <a:rPr lang="de-DE" dirty="0"/>
+              <a:t> </a:t>
+            </a:r>
+            <a:r>
+              <a:rPr lang="de-DE" dirty="0" err="1"/>
+              <a:t>similarity</a:t>
+            </a:r>
+            <a:endParaRPr lang="de-DE" dirty="0"/>
+          </a:p>
+          <a:p>
+            <a:pPr lvl="1"/>
+            <a:r>
+              <a:rPr lang="de-DE" dirty="0" err="1"/>
+              <a:t>Attacker</a:t>
+            </a:r>
+            <a:r>
+              <a:rPr lang="de-DE" dirty="0"/>
+              <a:t>: </a:t>
+            </a:r>
+            <a:r>
+              <a:rPr lang="de-DE" dirty="0" err="1"/>
+              <a:t>tries</a:t>
+            </a:r>
+            <a:r>
+              <a:rPr lang="de-DE" dirty="0"/>
+              <a:t> </a:t>
+            </a:r>
+            <a:r>
               <a:rPr lang="de-DE" dirty="0" err="1"/>
               <a:t>to</a:t>
             </a:r>
@@ -5390,11 +6459,89 @@
             </a:r>
             <a:r>
               <a:rPr lang="de-DE" dirty="0" err="1"/>
+              <a:t>embed</a:t>
+            </a:r>
+            <a:r>
+              <a:rPr lang="de-DE" dirty="0"/>
+              <a:t> </a:t>
+            </a:r>
+            <a:r>
+              <a:rPr lang="de-DE" dirty="0" err="1"/>
+              <a:t>his</a:t>
+            </a:r>
+            <a:r>
+              <a:rPr lang="de-DE" dirty="0"/>
+              <a:t> </a:t>
+            </a:r>
+            <a:r>
+              <a:rPr lang="de-DE" dirty="0" err="1"/>
+              <a:t>own</a:t>
+            </a:r>
+            <a:r>
+              <a:rPr lang="de-DE" dirty="0"/>
+              <a:t> </a:t>
+            </a:r>
+            <a:r>
+              <a:rPr lang="de-DE" dirty="0" err="1"/>
+              <a:t>watermark</a:t>
+            </a:r>
+            <a:endParaRPr lang="de-DE" dirty="0"/>
+          </a:p>
+          <a:p>
+            <a:r>
+              <a:rPr lang="de-DE" dirty="0"/>
+              <a:t>Analysis </a:t>
+            </a:r>
+            <a:r>
+              <a:rPr lang="de-DE" dirty="0" err="1"/>
+              <a:t>of</a:t>
+            </a:r>
+            <a:r>
+              <a:rPr lang="de-DE" dirty="0"/>
+              <a:t> </a:t>
+            </a:r>
+            <a:r>
+              <a:rPr lang="de-DE" dirty="0" err="1"/>
+              <a:t>the</a:t>
+            </a:r>
+            <a:r>
+              <a:rPr lang="de-DE" dirty="0"/>
+              <a:t> </a:t>
+            </a:r>
+            <a:r>
+              <a:rPr lang="de-DE" dirty="0" err="1"/>
+              <a:t>Watermarking</a:t>
+            </a:r>
+            <a:r>
+              <a:rPr lang="de-DE" dirty="0"/>
+              <a:t> System</a:t>
+            </a:r>
+          </a:p>
+          <a:p>
+            <a:pPr lvl="1"/>
+            <a:r>
+              <a:rPr lang="de-DE" dirty="0" err="1"/>
+              <a:t>Rightful</a:t>
+            </a:r>
+            <a:r>
+              <a:rPr lang="de-DE" dirty="0"/>
+              <a:t> Ownership Problem (Multiple </a:t>
+            </a:r>
+            <a:r>
+              <a:rPr lang="de-DE" dirty="0" err="1"/>
+              <a:t>public</a:t>
+            </a:r>
+            <a:r>
+              <a:rPr lang="de-DE" dirty="0"/>
+              <a:t> </a:t>
+            </a:r>
+            <a:r>
+              <a:rPr lang="de-DE" dirty="0" err="1"/>
               <a:t>watermarked</a:t>
             </a:r>
             <a:r>
               <a:rPr lang="de-DE" dirty="0"/>
-              <a:t> &amp; original </a:t>
+              <a:t> </a:t>
             </a:r>
             <a:r>
               <a:rPr lang="de-DE" dirty="0" err="1"/>
@@ -5402,157 +6549,24 @@
             </a:r>
             <a:r>
               <a:rPr lang="de-DE" dirty="0"/>
-              <a:t> </a:t>
-            </a:r>
+              <a:t>) </a:t>
+            </a:r>
+          </a:p>
+          <a:p>
+            <a:pPr lvl="1"/>
             <a:r>
               <a:rPr lang="de-DE" dirty="0" err="1"/>
-              <a:t>and</a:t>
-            </a:r>
-            <a:r>
-              <a:rPr lang="de-DE" dirty="0"/>
-              <a:t> </a:t>
-            </a:r>
-            <a:r>
-              <a:rPr lang="de-DE" dirty="0" err="1"/>
-              <a:t>computes</a:t>
-            </a:r>
-            <a:r>
-              <a:rPr lang="de-DE" dirty="0"/>
-              <a:t> </a:t>
-            </a:r>
-            <a:r>
-              <a:rPr lang="de-DE" dirty="0" err="1"/>
-              <a:t>the</a:t>
-            </a:r>
-            <a:r>
-              <a:rPr lang="de-DE" dirty="0"/>
-              <a:t> </a:t>
-            </a:r>
-            <a:r>
-              <a:rPr lang="de-DE" dirty="0" err="1"/>
-              <a:t>similarity</a:t>
-            </a:r>
-            <a:endParaRPr lang="de-DE" dirty="0"/>
-          </a:p>
-          <a:p>
-            <a:pPr lvl="1"/>
-            <a:r>
-              <a:rPr lang="de-DE" dirty="0" err="1"/>
-              <a:t>Attacker</a:t>
-            </a:r>
-            <a:r>
-              <a:rPr lang="de-DE" dirty="0"/>
-              <a:t>: </a:t>
-            </a:r>
-            <a:r>
-              <a:rPr lang="de-DE" dirty="0" err="1"/>
-              <a:t>tries</a:t>
-            </a:r>
-            <a:r>
-              <a:rPr lang="de-DE" dirty="0"/>
-              <a:t> </a:t>
-            </a:r>
-            <a:r>
-              <a:rPr lang="de-DE" dirty="0" err="1"/>
-              <a:t>to</a:t>
-            </a:r>
-            <a:r>
-              <a:rPr lang="de-DE" dirty="0"/>
-              <a:t> </a:t>
-            </a:r>
-            <a:r>
-              <a:rPr lang="de-DE" dirty="0" err="1"/>
-              <a:t>embed</a:t>
-            </a:r>
-            <a:r>
-              <a:rPr lang="de-DE" dirty="0"/>
-              <a:t> </a:t>
-            </a:r>
-            <a:r>
-              <a:rPr lang="de-DE" dirty="0" err="1"/>
-              <a:t>his</a:t>
-            </a:r>
-            <a:r>
-              <a:rPr lang="de-DE" dirty="0"/>
-              <a:t> </a:t>
-            </a:r>
-            <a:r>
-              <a:rPr lang="de-DE" dirty="0" err="1"/>
-              <a:t>own</a:t>
-            </a:r>
-            <a:r>
-              <a:rPr lang="de-DE" dirty="0"/>
-              <a:t> </a:t>
-            </a:r>
-            <a:r>
-              <a:rPr lang="de-DE" dirty="0" err="1"/>
-              <a:t>watermark</a:t>
-            </a:r>
-            <a:endParaRPr lang="de-DE" dirty="0"/>
-          </a:p>
-          <a:p>
-            <a:r>
-              <a:rPr lang="de-DE" dirty="0"/>
-              <a:t>Analysis </a:t>
-            </a:r>
-            <a:r>
-              <a:rPr lang="de-DE" dirty="0" err="1"/>
-              <a:t>of</a:t>
-            </a:r>
-            <a:r>
-              <a:rPr lang="de-DE" dirty="0"/>
-              <a:t> </a:t>
-            </a:r>
-            <a:r>
-              <a:rPr lang="de-DE" dirty="0" err="1"/>
-              <a:t>the</a:t>
-            </a:r>
-            <a:r>
-              <a:rPr lang="de-DE" dirty="0"/>
-              <a:t> </a:t>
-            </a:r>
-            <a:r>
-              <a:rPr lang="de-DE" dirty="0" err="1"/>
-              <a:t>Watermarking</a:t>
-            </a:r>
-            <a:r>
-              <a:rPr lang="de-DE" dirty="0"/>
-              <a:t> System</a:t>
-            </a:r>
-          </a:p>
-          <a:p>
-            <a:pPr lvl="1"/>
-            <a:r>
-              <a:rPr lang="de-DE" dirty="0" err="1"/>
-              <a:t>Rightful</a:t>
-            </a:r>
-            <a:r>
-              <a:rPr lang="de-DE" dirty="0"/>
-              <a:t> Ownership Problem (Multiple </a:t>
-            </a:r>
-            <a:r>
-              <a:rPr lang="de-DE" dirty="0" err="1"/>
-              <a:t>public</a:t>
-            </a:r>
-            <a:r>
-              <a:rPr lang="de-DE" dirty="0"/>
-              <a:t> </a:t>
-            </a:r>
-            <a:r>
-              <a:rPr lang="de-DE" dirty="0" err="1"/>
-              <a:t>watermarked</a:t>
-            </a:r>
-            <a:r>
-              <a:rPr lang="de-DE" dirty="0"/>
-              <a:t> </a:t>
-            </a:r>
-            <a:r>
-              <a:rPr lang="de-DE" dirty="0" err="1"/>
-              <a:t>images</a:t>
-            </a:r>
-            <a:r>
-              <a:rPr lang="de-DE" dirty="0"/>
-              <a:t>) </a:t>
+              <a:t>others</a:t>
+            </a:r>
+            <a:r>
+              <a:rPr lang="de-DE" dirty="0"/>
+              <a:t>???</a:t>
+            </a:r>
+          </a:p>
+          <a:p>
+            <a:r>
+              <a:rPr lang="de-DE" dirty="0" smtClean="0"/>
+              <a:t>Python 3.7</a:t>
             </a:r>
           </a:p>
         </p:txBody>
@@ -5574,7 +6588,7 @@
           <a:p>
             <a:fld id="{33952DF4-4134-4E04-B558-33FBB746CAE9}" type="datetime1">
               <a:rPr lang="de-DE" smtClean="0"/>
-              <a:t>11.09.2019</a:t>
+              <a:t>12.09.2019</a:t>
             </a:fld>
             <a:endParaRPr lang="de-DE"/>
           </a:p>
@@ -5694,6 +6708,61 @@
           <a:bodyPr/>
           <a:lstStyle/>
           <a:p>
+            <a:r>
+              <a:rPr lang="de-DE" dirty="0" smtClean="0"/>
+              <a:t>Pseudocode </a:t>
+            </a:r>
+            <a:r>
+              <a:rPr lang="de-DE" dirty="0" err="1" smtClean="0"/>
+              <a:t>of</a:t>
+            </a:r>
+            <a:r>
+              <a:rPr lang="de-DE" dirty="0" smtClean="0"/>
+              <a:t> </a:t>
+            </a:r>
+            <a:r>
+              <a:rPr lang="de-DE" dirty="0" err="1" smtClean="0"/>
+              <a:t>our</a:t>
+            </a:r>
+            <a:r>
+              <a:rPr lang="de-DE" dirty="0" smtClean="0"/>
+              <a:t> </a:t>
+            </a:r>
+            <a:r>
+              <a:rPr lang="de-DE" dirty="0" err="1" smtClean="0"/>
+              <a:t>own</a:t>
+            </a:r>
+            <a:r>
+              <a:rPr lang="de-DE" dirty="0" smtClean="0"/>
+              <a:t> </a:t>
+            </a:r>
+            <a:r>
+              <a:rPr lang="de-DE" dirty="0" err="1" smtClean="0"/>
+              <a:t>implementation</a:t>
+            </a:r>
+            <a:endParaRPr lang="de-DE" dirty="0" smtClean="0"/>
+          </a:p>
+          <a:p>
+            <a:r>
+              <a:rPr lang="de-DE" dirty="0" err="1" smtClean="0"/>
+              <a:t>Some</a:t>
+            </a:r>
+            <a:r>
+              <a:rPr lang="de-DE" dirty="0" smtClean="0"/>
+              <a:t> </a:t>
+            </a:r>
+            <a:r>
+              <a:rPr lang="de-DE" dirty="0" err="1" smtClean="0"/>
+              <a:t>explanations</a:t>
+            </a:r>
+            <a:r>
+              <a:rPr lang="de-DE" dirty="0" smtClean="0"/>
+              <a:t> </a:t>
+            </a:r>
+            <a:r>
+              <a:rPr lang="de-DE" dirty="0" err="1" smtClean="0"/>
+              <a:t>maybe</a:t>
+            </a:r>
             <a:endParaRPr lang="de-DE" dirty="0"/>
           </a:p>
         </p:txBody>
@@ -5715,7 +6784,7 @@
           <a:p>
             <a:fld id="{2166EBB3-8A50-47F5-B62B-39BE2A930B15}" type="datetime1">
               <a:rPr lang="de-DE" smtClean="0"/>
-              <a:t>11.09.2019</a:t>
+              <a:t>12.09.2019</a:t>
             </a:fld>
             <a:endParaRPr lang="de-DE"/>
           </a:p>
@@ -5856,7 +6925,7 @@
           <a:p>
             <a:fld id="{2166EBB3-8A50-47F5-B62B-39BE2A930B15}" type="datetime1">
               <a:rPr lang="de-DE" smtClean="0"/>
-              <a:t>11.09.2019</a:t>
+              <a:t>12.09.2019</a:t>
             </a:fld>
             <a:endParaRPr lang="de-DE"/>
           </a:p>
@@ -5997,7 +7066,7 @@
           <a:p>
             <a:fld id="{2166EBB3-8A50-47F5-B62B-39BE2A930B15}" type="datetime1">
               <a:rPr lang="de-DE" smtClean="0"/>
-              <a:t>11.09.2019</a:t>
+              <a:t>12.09.2019</a:t>
             </a:fld>
             <a:endParaRPr lang="de-DE"/>
           </a:p>
@@ -6091,9 +7160,10 @@
           <a:lstStyle/>
           <a:p>
             <a:r>
-              <a:rPr lang="de-DE" dirty="0"/>
+              <a:rPr lang="de-DE" dirty="0" smtClean="0"/>
               <a:t>Analysis</a:t>
             </a:r>
+            <a:endParaRPr lang="de-DE" dirty="0"/>
           </a:p>
         </p:txBody>
       </p:sp>
@@ -6112,7 +7182,61 @@
           <a:bodyPr/>
           <a:lstStyle/>
           <a:p>
-            <a:endParaRPr lang="de-DE"/>
+            <a:r>
+              <a:rPr lang="de-DE" dirty="0" err="1" smtClean="0"/>
+              <a:t>What</a:t>
+            </a:r>
+            <a:r>
+              <a:rPr lang="de-DE" dirty="0" smtClean="0"/>
+              <a:t> do </a:t>
+            </a:r>
+            <a:r>
+              <a:rPr lang="de-DE" dirty="0" err="1" smtClean="0"/>
+              <a:t>we</a:t>
+            </a:r>
+            <a:r>
+              <a:rPr lang="de-DE" dirty="0" smtClean="0"/>
+              <a:t> </a:t>
+            </a:r>
+            <a:r>
+              <a:rPr lang="de-DE" dirty="0" err="1" smtClean="0"/>
+              <a:t>want</a:t>
+            </a:r>
+            <a:r>
+              <a:rPr lang="de-DE" dirty="0" smtClean="0"/>
+              <a:t> </a:t>
+            </a:r>
+            <a:r>
+              <a:rPr lang="de-DE" dirty="0" err="1" smtClean="0"/>
+              <a:t>to</a:t>
+            </a:r>
+            <a:r>
+              <a:rPr lang="de-DE" dirty="0" smtClean="0"/>
+              <a:t> find out</a:t>
+            </a:r>
+          </a:p>
+          <a:p>
+            <a:r>
+              <a:rPr lang="de-DE" dirty="0" err="1" smtClean="0"/>
+              <a:t>Maybe</a:t>
+            </a:r>
+            <a:r>
+              <a:rPr lang="de-DE" dirty="0" smtClean="0"/>
+              <a:t> </a:t>
+            </a:r>
+            <a:r>
+              <a:rPr lang="de-DE" dirty="0" err="1" smtClean="0"/>
+              <a:t>some</a:t>
+            </a:r>
+            <a:r>
+              <a:rPr lang="de-DE" dirty="0" smtClean="0"/>
+              <a:t> </a:t>
+            </a:r>
+            <a:r>
+              <a:rPr lang="de-DE" dirty="0" err="1" smtClean="0"/>
+              <a:t>expectations</a:t>
+            </a:r>
+            <a:endParaRPr lang="de-DE" dirty="0"/>
           </a:p>
         </p:txBody>
       </p:sp>
@@ -6131,9 +7255,9 @@
           <a:bodyPr/>
           <a:lstStyle/>
           <a:p>
-            <a:fld id="{8DDE0F79-E5D1-44CE-927E-4B1B7AFF40E2}" type="datetime1">
+            <a:fld id="{307485B1-CA46-471F-B10F-11A9B4F2D1B3}" type="datetime1">
               <a:rPr lang="de-DE" smtClean="0"/>
-              <a:t>11.09.2019</a:t>
+              <a:t>12.09.2019</a:t>
             </a:fld>
             <a:endParaRPr lang="de-DE"/>
           </a:p>
@@ -6184,7 +7308,484 @@
     </p:spTree>
     <p:extLst>
       <p:ext uri="{BB962C8B-B14F-4D97-AF65-F5344CB8AC3E}">
+        <p14:creationId xmlns:p14="http://schemas.microsoft.com/office/powerpoint/2010/main" val="712455944"/>
+      </p:ext>
+    </p:extLst>
+  </p:cSld>
+  <p:clrMapOvr>
+    <a:masterClrMapping/>
+  </p:clrMapOvr>
+</p:sld>
+</file>
+
+<file path=ppt/slides/slide8.xml><?xml version="1.0" encoding="utf-8"?>
+<p:sld xmlns:a="http://schemas.openxmlformats.org/drawingml/2006/main" xmlns:r="http://schemas.openxmlformats.org/officeDocument/2006/relationships" xmlns:p="http://schemas.openxmlformats.org/presentationml/2006/main">
+  <p:cSld>
+    <p:spTree>
+      <p:nvGrpSpPr>
+        <p:cNvPr id="1" name=""/>
+        <p:cNvGrpSpPr/>
+        <p:nvPr/>
+      </p:nvGrpSpPr>
+      <p:grpSpPr>
+        <a:xfrm>
+          <a:off x="0" y="0"/>
+          <a:ext cx="0" cy="0"/>
+          <a:chOff x="0" y="0"/>
+          <a:chExt cx="0" cy="0"/>
+        </a:xfrm>
+      </p:grpSpPr>
+      <p:sp>
+        <p:nvSpPr>
+          <p:cNvPr id="2" name="Titel 1"/>
+          <p:cNvSpPr>
+            <a:spLocks noGrp="1"/>
+          </p:cNvSpPr>
+          <p:nvPr>
+            <p:ph type="title"/>
+          </p:nvPr>
+        </p:nvSpPr>
+        <p:spPr/>
+        <p:txBody>
+          <a:bodyPr/>
+          <a:lstStyle/>
+          <a:p>
+            <a:r>
+              <a:rPr lang="de-DE" dirty="0" smtClean="0"/>
+              <a:t>Analysis - </a:t>
+            </a:r>
+            <a:r>
+              <a:rPr lang="de-DE" dirty="0" err="1" smtClean="0"/>
+              <a:t>Procedure</a:t>
+            </a:r>
+            <a:endParaRPr lang="de-DE" dirty="0"/>
+          </a:p>
+        </p:txBody>
+      </p:sp>
+      <p:sp>
+        <p:nvSpPr>
+          <p:cNvPr id="3" name="Inhaltsplatzhalter 2"/>
+          <p:cNvSpPr>
+            <a:spLocks noGrp="1"/>
+          </p:cNvSpPr>
+          <p:nvPr>
+            <p:ph idx="1"/>
+          </p:nvPr>
+        </p:nvSpPr>
+        <p:spPr/>
+        <p:txBody>
+          <a:bodyPr/>
+          <a:lstStyle/>
+          <a:p>
+            <a:r>
+              <a:rPr lang="de-DE" dirty="0" smtClean="0"/>
+              <a:t>Take X </a:t>
+            </a:r>
+            <a:r>
+              <a:rPr lang="de-DE" dirty="0" err="1" smtClean="0"/>
+              <a:t>photos</a:t>
+            </a:r>
+            <a:r>
+              <a:rPr lang="de-DE" dirty="0" smtClean="0"/>
+              <a:t> </a:t>
+            </a:r>
+            <a:r>
+              <a:rPr lang="de-DE" dirty="0" err="1" smtClean="0"/>
+              <a:t>with</a:t>
+            </a:r>
+            <a:r>
+              <a:rPr lang="de-DE" dirty="0" smtClean="0"/>
+              <a:t> different </a:t>
+            </a:r>
+            <a:r>
+              <a:rPr lang="de-DE" dirty="0" err="1" smtClean="0"/>
+              <a:t>features</a:t>
+            </a:r>
+            <a:endParaRPr lang="de-DE" dirty="0" smtClean="0"/>
+          </a:p>
+          <a:p>
+            <a:r>
+              <a:rPr lang="de-DE" dirty="0" smtClean="0"/>
+              <a:t>Run </a:t>
+            </a:r>
+            <a:r>
+              <a:rPr lang="de-DE" dirty="0" err="1" smtClean="0"/>
+              <a:t>the</a:t>
+            </a:r>
+            <a:r>
+              <a:rPr lang="de-DE" dirty="0" smtClean="0"/>
+              <a:t> </a:t>
+            </a:r>
+            <a:r>
+              <a:rPr lang="de-DE" dirty="0" err="1" smtClean="0"/>
+              <a:t>algorithms</a:t>
+            </a:r>
+            <a:r>
+              <a:rPr lang="de-DE" dirty="0" smtClean="0"/>
+              <a:t> </a:t>
+            </a:r>
+            <a:r>
+              <a:rPr lang="de-DE" dirty="0" err="1" smtClean="0"/>
+              <a:t>for</a:t>
+            </a:r>
+            <a:r>
+              <a:rPr lang="de-DE" dirty="0" smtClean="0"/>
+              <a:t> </a:t>
+            </a:r>
+            <a:r>
+              <a:rPr lang="de-DE" dirty="0" err="1" smtClean="0"/>
+              <a:t>each</a:t>
+            </a:r>
+            <a:r>
+              <a:rPr lang="de-DE" dirty="0" smtClean="0"/>
+              <a:t> </a:t>
+            </a:r>
+            <a:r>
+              <a:rPr lang="de-DE" dirty="0" err="1" smtClean="0"/>
+              <a:t>photo</a:t>
+            </a:r>
+            <a:endParaRPr lang="de-DE" dirty="0" smtClean="0"/>
+          </a:p>
+          <a:p>
+            <a:r>
+              <a:rPr lang="de-DE" dirty="0" smtClean="0"/>
+              <a:t>‚do </a:t>
+            </a:r>
+            <a:r>
+              <a:rPr lang="de-DE" dirty="0" err="1" smtClean="0"/>
+              <a:t>the</a:t>
+            </a:r>
+            <a:r>
+              <a:rPr lang="de-DE" dirty="0" smtClean="0"/>
+              <a:t> </a:t>
+            </a:r>
+            <a:r>
+              <a:rPr lang="de-DE" dirty="0" err="1" smtClean="0"/>
+              <a:t>math</a:t>
+            </a:r>
+            <a:r>
+              <a:rPr lang="de-DE" dirty="0" smtClean="0"/>
+              <a:t>‘</a:t>
+            </a:r>
+          </a:p>
+          <a:p>
+            <a:r>
+              <a:rPr lang="de-DE" dirty="0" smtClean="0"/>
+              <a:t>Plot </a:t>
+            </a:r>
+            <a:r>
+              <a:rPr lang="de-DE" dirty="0" err="1" smtClean="0"/>
+              <a:t>the</a:t>
+            </a:r>
+            <a:r>
+              <a:rPr lang="de-DE" dirty="0" smtClean="0"/>
+              <a:t> </a:t>
+            </a:r>
+            <a:r>
+              <a:rPr lang="de-DE" dirty="0" err="1" smtClean="0"/>
+              <a:t>results</a:t>
+            </a:r>
+            <a:endParaRPr lang="de-DE" dirty="0" smtClean="0"/>
+          </a:p>
+          <a:p>
+            <a:r>
+              <a:rPr lang="de-DE" dirty="0" smtClean="0"/>
+              <a:t>Find a </a:t>
+            </a:r>
+            <a:r>
+              <a:rPr lang="de-DE" dirty="0" err="1" smtClean="0"/>
+              <a:t>conclusion</a:t>
+            </a:r>
+            <a:endParaRPr lang="de-DE" dirty="0"/>
+          </a:p>
+        </p:txBody>
+      </p:sp>
+      <p:sp>
+        <p:nvSpPr>
+          <p:cNvPr id="4" name="Datumsplatzhalter 3"/>
+          <p:cNvSpPr>
+            <a:spLocks noGrp="1"/>
+          </p:cNvSpPr>
+          <p:nvPr>
+            <p:ph type="dt" sz="half" idx="10"/>
+          </p:nvPr>
+        </p:nvSpPr>
+        <p:spPr/>
+        <p:txBody>
+          <a:bodyPr/>
+          <a:lstStyle/>
+          <a:p>
+            <a:fld id="{8DDE0F79-E5D1-44CE-927E-4B1B7AFF40E2}" type="datetime1">
+              <a:rPr lang="de-DE" smtClean="0"/>
+              <a:t>12.09.2019</a:t>
+            </a:fld>
+            <a:endParaRPr lang="de-DE"/>
+          </a:p>
+        </p:txBody>
+      </p:sp>
+      <p:sp>
+        <p:nvSpPr>
+          <p:cNvPr id="5" name="Fußzeilenplatzhalter 4"/>
+          <p:cNvSpPr>
+            <a:spLocks noGrp="1"/>
+          </p:cNvSpPr>
+          <p:nvPr>
+            <p:ph type="ftr" sz="quarter" idx="11"/>
+          </p:nvPr>
+        </p:nvSpPr>
+        <p:spPr/>
+        <p:txBody>
+          <a:bodyPr/>
+          <a:lstStyle/>
+          <a:p>
+            <a:endParaRPr lang="de-DE"/>
+          </a:p>
+        </p:txBody>
+      </p:sp>
+      <p:sp>
+        <p:nvSpPr>
+          <p:cNvPr id="6" name="Foliennummernplatzhalter 5"/>
+          <p:cNvSpPr>
+            <a:spLocks noGrp="1"/>
+          </p:cNvSpPr>
+          <p:nvPr>
+            <p:ph type="sldNum" sz="quarter" idx="12"/>
+          </p:nvPr>
+        </p:nvSpPr>
+        <p:spPr/>
+        <p:txBody>
+          <a:bodyPr/>
+          <a:lstStyle/>
+          <a:p>
+            <a:fld id="{1A59CD77-CAB0-4B8E-89CD-FC7476DE0784}" type="slidenum">
+              <a:rPr lang="de-DE" smtClean="0"/>
+              <a:t>8</a:t>
+            </a:fld>
+            <a:endParaRPr lang="de-DE"/>
+          </a:p>
+        </p:txBody>
+      </p:sp>
+    </p:spTree>
+    <p:extLst>
+      <p:ext uri="{BB962C8B-B14F-4D97-AF65-F5344CB8AC3E}">
         <p14:creationId xmlns:p14="http://schemas.microsoft.com/office/powerpoint/2010/main" val="2928133082"/>
+      </p:ext>
+    </p:extLst>
+  </p:cSld>
+  <p:clrMapOvr>
+    <a:masterClrMapping/>
+  </p:clrMapOvr>
+</p:sld>
+</file>
+
+<file path=ppt/slides/slide9.xml><?xml version="1.0" encoding="utf-8"?>
+<p:sld xmlns:a="http://schemas.openxmlformats.org/drawingml/2006/main" xmlns:r="http://schemas.openxmlformats.org/officeDocument/2006/relationships" xmlns:p="http://schemas.openxmlformats.org/presentationml/2006/main">
+  <p:cSld>
+    <p:spTree>
+      <p:nvGrpSpPr>
+        <p:cNvPr id="1" name=""/>
+        <p:cNvGrpSpPr/>
+        <p:nvPr/>
+      </p:nvGrpSpPr>
+      <p:grpSpPr>
+        <a:xfrm>
+          <a:off x="0" y="0"/>
+          <a:ext cx="0" cy="0"/>
+          <a:chOff x="0" y="0"/>
+          <a:chExt cx="0" cy="0"/>
+        </a:xfrm>
+      </p:grpSpPr>
+      <p:sp>
+        <p:nvSpPr>
+          <p:cNvPr id="2" name="Titel 1"/>
+          <p:cNvSpPr>
+            <a:spLocks noGrp="1"/>
+          </p:cNvSpPr>
+          <p:nvPr>
+            <p:ph type="title"/>
+          </p:nvPr>
+        </p:nvSpPr>
+        <p:spPr/>
+        <p:txBody>
+          <a:bodyPr/>
+          <a:lstStyle/>
+          <a:p>
+            <a:r>
+              <a:rPr lang="de-DE" dirty="0" smtClean="0"/>
+              <a:t>Analysis - The </a:t>
+            </a:r>
+            <a:r>
+              <a:rPr lang="de-DE" dirty="0" err="1" smtClean="0"/>
+              <a:t>Photo</a:t>
+            </a:r>
+            <a:r>
+              <a:rPr lang="de-DE" dirty="0" smtClean="0"/>
+              <a:t> Set</a:t>
+            </a:r>
+            <a:endParaRPr lang="de-DE" dirty="0"/>
+          </a:p>
+        </p:txBody>
+      </p:sp>
+      <p:sp>
+        <p:nvSpPr>
+          <p:cNvPr id="3" name="Inhaltsplatzhalter 2"/>
+          <p:cNvSpPr>
+            <a:spLocks noGrp="1"/>
+          </p:cNvSpPr>
+          <p:nvPr>
+            <p:ph idx="1"/>
+          </p:nvPr>
+        </p:nvSpPr>
+        <p:spPr/>
+        <p:txBody>
+          <a:bodyPr/>
+          <a:lstStyle/>
+          <a:p>
+            <a:r>
+              <a:rPr lang="de-DE" dirty="0" smtClean="0"/>
+              <a:t>All </a:t>
+            </a:r>
+            <a:r>
+              <a:rPr lang="de-DE" dirty="0" err="1" smtClean="0"/>
+              <a:t>photos</a:t>
+            </a:r>
+            <a:r>
+              <a:rPr lang="de-DE" dirty="0" smtClean="0"/>
+              <a:t> </a:t>
+            </a:r>
+            <a:r>
+              <a:rPr lang="de-DE" dirty="0" err="1" smtClean="0"/>
+              <a:t>we</a:t>
+            </a:r>
+            <a:r>
+              <a:rPr lang="de-DE" dirty="0" smtClean="0"/>
+              <a:t> </a:t>
+            </a:r>
+            <a:r>
+              <a:rPr lang="de-DE" dirty="0" err="1" smtClean="0"/>
+              <a:t>used</a:t>
+            </a:r>
+            <a:r>
+              <a:rPr lang="de-DE" dirty="0" smtClean="0"/>
+              <a:t> </a:t>
+            </a:r>
+            <a:r>
+              <a:rPr lang="de-DE" dirty="0" err="1" smtClean="0"/>
+              <a:t>for</a:t>
+            </a:r>
+            <a:r>
+              <a:rPr lang="de-DE" dirty="0" smtClean="0"/>
+              <a:t> </a:t>
+            </a:r>
+            <a:r>
+              <a:rPr lang="de-DE" dirty="0" err="1" smtClean="0"/>
+              <a:t>the</a:t>
+            </a:r>
+            <a:r>
+              <a:rPr lang="de-DE" dirty="0" smtClean="0"/>
+              <a:t> </a:t>
+            </a:r>
+            <a:r>
+              <a:rPr lang="de-DE" dirty="0" err="1" smtClean="0"/>
+              <a:t>analysis</a:t>
+            </a:r>
+            <a:r>
+              <a:rPr lang="de-DE" dirty="0" smtClean="0"/>
+              <a:t> </a:t>
+            </a:r>
+            <a:r>
+              <a:rPr lang="de-DE" dirty="0" err="1" smtClean="0"/>
+              <a:t>as</a:t>
+            </a:r>
+            <a:r>
+              <a:rPr lang="de-DE" dirty="0" smtClean="0"/>
+              <a:t> a </a:t>
+            </a:r>
+            <a:r>
+              <a:rPr lang="de-DE" dirty="0" err="1" smtClean="0"/>
+              <a:t>collage</a:t>
+            </a:r>
+            <a:r>
+              <a:rPr lang="de-DE" dirty="0" smtClean="0"/>
+              <a:t> </a:t>
+            </a:r>
+            <a:r>
+              <a:rPr lang="de-DE" dirty="0" err="1" smtClean="0"/>
+              <a:t>here</a:t>
+            </a:r>
+            <a:endParaRPr lang="de-DE" dirty="0"/>
+          </a:p>
+        </p:txBody>
+      </p:sp>
+      <p:sp>
+        <p:nvSpPr>
+          <p:cNvPr id="4" name="Datumsplatzhalter 3"/>
+          <p:cNvSpPr>
+            <a:spLocks noGrp="1"/>
+          </p:cNvSpPr>
+          <p:nvPr>
+            <p:ph type="dt" sz="half" idx="10"/>
+          </p:nvPr>
+        </p:nvSpPr>
+        <p:spPr/>
+        <p:txBody>
+          <a:bodyPr/>
+          <a:lstStyle/>
+          <a:p>
+            <a:fld id="{206EE6F0-B4EE-4F62-B6D6-6B3DEAB13BB9}" type="datetime1">
+              <a:rPr lang="de-DE" smtClean="0"/>
+              <a:t>12.09.2019</a:t>
+            </a:fld>
+            <a:endParaRPr lang="de-DE"/>
+          </a:p>
+        </p:txBody>
+      </p:sp>
+      <p:sp>
+        <p:nvSpPr>
+          <p:cNvPr id="5" name="Fußzeilenplatzhalter 4"/>
+          <p:cNvSpPr>
+            <a:spLocks noGrp="1"/>
+          </p:cNvSpPr>
+          <p:nvPr>
+            <p:ph type="ftr" sz="quarter" idx="11"/>
+          </p:nvPr>
+        </p:nvSpPr>
+        <p:spPr/>
+        <p:txBody>
+          <a:bodyPr/>
+          <a:lstStyle/>
+          <a:p>
+            <a:endParaRPr lang="de-DE"/>
+          </a:p>
+        </p:txBody>
+      </p:sp>
+      <p:sp>
+        <p:nvSpPr>
+          <p:cNvPr id="6" name="Foliennummernplatzhalter 5"/>
+          <p:cNvSpPr>
+            <a:spLocks noGrp="1"/>
+          </p:cNvSpPr>
+          <p:nvPr>
+            <p:ph type="sldNum" sz="quarter" idx="12"/>
+          </p:nvPr>
+        </p:nvSpPr>
+        <p:spPr/>
+        <p:txBody>
+          <a:bodyPr/>
+          <a:lstStyle/>
+          <a:p>
+            <a:fld id="{1A59CD77-CAB0-4B8E-89CD-FC7476DE0784}" type="slidenum">
+              <a:rPr lang="de-DE" smtClean="0"/>
+              <a:t>9</a:t>
+            </a:fld>
+            <a:endParaRPr lang="de-DE"/>
+          </a:p>
+        </p:txBody>
+      </p:sp>
+    </p:spTree>
+    <p:extLst>
+      <p:ext uri="{BB962C8B-B14F-4D97-AF65-F5344CB8AC3E}">
+        <p14:creationId xmlns:p14="http://schemas.microsoft.com/office/powerpoint/2010/main" val="1459727751"/>
       </p:ext>
     </p:extLst>
   </p:cSld>

</xml_diff>